<commit_message>
uORF figure was updated
</commit_message>
<xml_diff>
--- a/images/uORF_S_coelicolor.pptx
+++ b/images/uORF_S_coelicolor.pptx
@@ -208,7 +208,7 @@
           <a:p>
             <a:fld id="{C571D33F-B151-5442-9D79-DA0A881D815F}" type="datetimeFigureOut">
               <a:rPr lang="en-US" smtClean="0"/>
-              <a:t>5/17/23</a:t>
+              <a:t>5/30/23</a:t>
             </a:fld>
             <a:endParaRPr lang="en-US"/>
           </a:p>
@@ -743,7 +743,7 @@
           <a:p>
             <a:fld id="{01197F44-DB72-474A-9754-31703E05C006}" type="datetimeFigureOut">
               <a:rPr lang="en-US" smtClean="0"/>
-              <a:t>5/17/23</a:t>
+              <a:t>5/30/23</a:t>
             </a:fld>
             <a:endParaRPr lang="en-US"/>
           </a:p>
@@ -911,7 +911,7 @@
           <a:p>
             <a:fld id="{01197F44-DB72-474A-9754-31703E05C006}" type="datetimeFigureOut">
               <a:rPr lang="en-US" smtClean="0"/>
-              <a:t>5/17/23</a:t>
+              <a:t>5/30/23</a:t>
             </a:fld>
             <a:endParaRPr lang="en-US"/>
           </a:p>
@@ -1089,7 +1089,7 @@
           <a:p>
             <a:fld id="{01197F44-DB72-474A-9754-31703E05C006}" type="datetimeFigureOut">
               <a:rPr lang="en-US" smtClean="0"/>
-              <a:t>5/17/23</a:t>
+              <a:t>5/30/23</a:t>
             </a:fld>
             <a:endParaRPr lang="en-US"/>
           </a:p>
@@ -1257,7 +1257,7 @@
           <a:p>
             <a:fld id="{01197F44-DB72-474A-9754-31703E05C006}" type="datetimeFigureOut">
               <a:rPr lang="en-US" smtClean="0"/>
-              <a:t>5/17/23</a:t>
+              <a:t>5/30/23</a:t>
             </a:fld>
             <a:endParaRPr lang="en-US"/>
           </a:p>
@@ -1502,7 +1502,7 @@
           <a:p>
             <a:fld id="{01197F44-DB72-474A-9754-31703E05C006}" type="datetimeFigureOut">
               <a:rPr lang="en-US" smtClean="0"/>
-              <a:t>5/17/23</a:t>
+              <a:t>5/30/23</a:t>
             </a:fld>
             <a:endParaRPr lang="en-US"/>
           </a:p>
@@ -1787,7 +1787,7 @@
           <a:p>
             <a:fld id="{01197F44-DB72-474A-9754-31703E05C006}" type="datetimeFigureOut">
               <a:rPr lang="en-US" smtClean="0"/>
-              <a:t>5/17/23</a:t>
+              <a:t>5/30/23</a:t>
             </a:fld>
             <a:endParaRPr lang="en-US"/>
           </a:p>
@@ -2206,7 +2206,7 @@
           <a:p>
             <a:fld id="{01197F44-DB72-474A-9754-31703E05C006}" type="datetimeFigureOut">
               <a:rPr lang="en-US" smtClean="0"/>
-              <a:t>5/17/23</a:t>
+              <a:t>5/30/23</a:t>
             </a:fld>
             <a:endParaRPr lang="en-US"/>
           </a:p>
@@ -2323,7 +2323,7 @@
           <a:p>
             <a:fld id="{01197F44-DB72-474A-9754-31703E05C006}" type="datetimeFigureOut">
               <a:rPr lang="en-US" smtClean="0"/>
-              <a:t>5/17/23</a:t>
+              <a:t>5/30/23</a:t>
             </a:fld>
             <a:endParaRPr lang="en-US"/>
           </a:p>
@@ -2418,7 +2418,7 @@
           <a:p>
             <a:fld id="{01197F44-DB72-474A-9754-31703E05C006}" type="datetimeFigureOut">
               <a:rPr lang="en-US" smtClean="0"/>
-              <a:t>5/17/23</a:t>
+              <a:t>5/30/23</a:t>
             </a:fld>
             <a:endParaRPr lang="en-US"/>
           </a:p>
@@ -2693,7 +2693,7 @@
           <a:p>
             <a:fld id="{01197F44-DB72-474A-9754-31703E05C006}" type="datetimeFigureOut">
               <a:rPr lang="en-US" smtClean="0"/>
-              <a:t>5/17/23</a:t>
+              <a:t>5/30/23</a:t>
             </a:fld>
             <a:endParaRPr lang="en-US"/>
           </a:p>
@@ -2945,7 +2945,7 @@
           <a:p>
             <a:fld id="{01197F44-DB72-474A-9754-31703E05C006}" type="datetimeFigureOut">
               <a:rPr lang="en-US" smtClean="0"/>
-              <a:t>5/17/23</a:t>
+              <a:t>5/30/23</a:t>
             </a:fld>
             <a:endParaRPr lang="en-US"/>
           </a:p>
@@ -3156,7 +3156,7 @@
           <a:p>
             <a:fld id="{01197F44-DB72-474A-9754-31703E05C006}" type="datetimeFigureOut">
               <a:rPr lang="en-US" smtClean="0"/>
-              <a:t>5/17/23</a:t>
+              <a:t>5/30/23</a:t>
             </a:fld>
             <a:endParaRPr lang="en-US"/>
           </a:p>
@@ -3568,6 +3568,9 @@
             </a:r>
             <a:r>
               <a:rPr lang="en-US" sz="900" b="1" dirty="0">
+                <a:solidFill>
+                  <a:srgbClr val="FF0000"/>
+                </a:solidFill>
                 <a:latin typeface="Courier New" panose="02070309020205020404" pitchFamily="49" charset="0"/>
                 <a:cs typeface="Courier New" panose="02070309020205020404" pitchFamily="49" charset="0"/>
               </a:rPr>
@@ -3583,24 +3586,24 @@
             <a:r>
               <a:rPr lang="en-US" sz="900" b="1" dirty="0">
                 <a:solidFill>
-                  <a:srgbClr val="00B050"/>
+                  <a:srgbClr val="FF0000"/>
                 </a:solidFill>
                 <a:latin typeface="Courier New" panose="02070309020205020404" pitchFamily="49" charset="0"/>
                 <a:cs typeface="Courier New" panose="02070309020205020404" pitchFamily="49" charset="0"/>
               </a:rPr>
-              <a:t>GTG</a:t>
+              <a:t>GUG</a:t>
             </a:r>
             <a:r>
               <a:rPr lang="en-US" sz="900" dirty="0">
                 <a:latin typeface="Courier New" panose="02070309020205020404" pitchFamily="49" charset="0"/>
                 <a:cs typeface="Courier New" panose="02070309020205020404" pitchFamily="49" charset="0"/>
               </a:rPr>
-              <a:t>TTGGAGCGACAGACCCGAAGGGTGAAGGGCGCCGCGACCACC</a:t>
+              <a:t>UUGGAGCGACAGACCCGAAGGGUGAAGGGCGCCGCGACCACC</a:t>
             </a:r>
             <a:r>
               <a:rPr lang="en-US" sz="900" dirty="0">
                 <a:highlight>
-                  <a:srgbClr val="808080"/>
+                  <a:srgbClr val="C0C0C0"/>
                 </a:highlight>
                 <a:latin typeface="Courier New" panose="02070309020205020404" pitchFamily="49" charset="0"/>
                 <a:cs typeface="Courier New" panose="02070309020205020404" pitchFamily="49" charset="0"/>
@@ -3617,26 +3620,24 @@
             <a:r>
               <a:rPr lang="en-US" sz="900" b="1" dirty="0">
                 <a:solidFill>
-                  <a:schemeClr val="accent6">
-                    <a:lumMod val="75000"/>
-                  </a:schemeClr>
+                  <a:srgbClr val="FF0000"/>
                 </a:solidFill>
                 <a:latin typeface="Courier New" panose="02070309020205020404" pitchFamily="49" charset="0"/>
                 <a:cs typeface="Courier New" panose="02070309020205020404" pitchFamily="49" charset="0"/>
               </a:rPr>
-              <a:t>TTA</a:t>
+              <a:t>UUA</a:t>
             </a:r>
             <a:r>
               <a:rPr lang="en-US" sz="900" dirty="0">
                 <a:latin typeface="Courier New" panose="02070309020205020404" pitchFamily="49" charset="0"/>
                 <a:cs typeface="Courier New" panose="02070309020205020404" pitchFamily="49" charset="0"/>
               </a:rPr>
-              <a:t>GCAGT</a:t>
+              <a:t>GCAGU</a:t>
             </a:r>
             <a:r>
               <a:rPr lang="en-US" sz="900" dirty="0">
                 <a:highlight>
-                  <a:srgbClr val="00FF00"/>
+                  <a:srgbClr val="C0C0C0"/>
                 </a:highlight>
                 <a:latin typeface="Courier New" panose="02070309020205020404" pitchFamily="49" charset="0"/>
                 <a:cs typeface="Courier New" panose="02070309020205020404" pitchFamily="49" charset="0"/>
@@ -3649,12 +3650,12 @@
                   <a:srgbClr val="FF0000"/>
                 </a:solidFill>
                 <a:highlight>
-                  <a:srgbClr val="00FF00"/>
+                  <a:srgbClr val="C0C0C0"/>
                 </a:highlight>
                 <a:latin typeface="Courier New" panose="02070309020205020404" pitchFamily="49" charset="0"/>
                 <a:cs typeface="Courier New" panose="02070309020205020404" pitchFamily="49" charset="0"/>
               </a:rPr>
-              <a:t>TG</a:t>
+              <a:t>UG</a:t>
             </a:r>
             <a:r>
               <a:rPr lang="en-US" sz="900" b="1" dirty="0">
@@ -3708,14 +3709,14 @@
             <a:r>
               <a:rPr lang="en-US" sz="1000" dirty="0" err="1">
                 <a:solidFill>
-                  <a:srgbClr val="00B050"/>
+                  <a:srgbClr val="FF0000"/>
                 </a:solidFill>
               </a:rPr>
               <a:t>uORF</a:t>
             </a:r>
             <a:endParaRPr lang="en-US" sz="1000" dirty="0">
               <a:solidFill>
-                <a:srgbClr val="00B050"/>
+                <a:srgbClr val="FF0000"/>
               </a:solidFill>
             </a:endParaRPr>
           </a:p>
@@ -3724,7 +3725,7 @@
             <a:r>
               <a:rPr lang="en-US" sz="1000" dirty="0">
                 <a:solidFill>
-                  <a:srgbClr val="00B050"/>
+                  <a:srgbClr val="FF0000"/>
                 </a:solidFill>
               </a:rPr>
               <a:t>putative</a:t>
@@ -3735,7 +3736,7 @@
             <a:r>
               <a:rPr lang="en-US" sz="1000" dirty="0">
                 <a:solidFill>
-                  <a:srgbClr val="00B050"/>
+                  <a:srgbClr val="FF0000"/>
                 </a:solidFill>
               </a:rPr>
               <a:t>start codon</a:t>
@@ -3766,6 +3767,9 @@
             <a:avLst/>
           </a:prstGeom>
           <a:ln>
+            <a:solidFill>
+              <a:srgbClr val="FF0000"/>
+            </a:solidFill>
             <a:tailEnd type="triangle"/>
           </a:ln>
         </p:spPr>
@@ -3814,23 +3818,39 @@
           <a:p>
             <a:pPr algn="ctr"/>
             <a:r>
-              <a:rPr lang="en-US" sz="1000" dirty="0" err="1"/>
+              <a:rPr lang="en-US" sz="1000" dirty="0" err="1">
+                <a:solidFill>
+                  <a:srgbClr val="FF0000"/>
+                </a:solidFill>
+              </a:rPr>
               <a:t>uORF</a:t>
             </a:r>
-            <a:endParaRPr lang="en-US" sz="1000" dirty="0"/>
+            <a:endParaRPr lang="en-US" sz="1000" dirty="0">
+              <a:solidFill>
+                <a:srgbClr val="FF0000"/>
+              </a:solidFill>
+            </a:endParaRPr>
           </a:p>
           <a:p>
             <a:pPr algn="ctr"/>
             <a:r>
-              <a:rPr lang="en-US" sz="1000" dirty="0"/>
+              <a:rPr lang="en-US" sz="1000" dirty="0">
+                <a:solidFill>
+                  <a:srgbClr val="FF0000"/>
+                </a:solidFill>
+              </a:rPr>
               <a:t>putative</a:t>
             </a:r>
           </a:p>
           <a:p>
             <a:pPr algn="ctr"/>
             <a:r>
-              <a:rPr lang="en-US" sz="1000" dirty="0"/>
-              <a:t>SD</a:t>
+              <a:rPr lang="en-US" sz="1000" dirty="0">
+                <a:solidFill>
+                  <a:srgbClr val="FF0000"/>
+                </a:solidFill>
+              </a:rPr>
+              <a:t>SD site</a:t>
             </a:r>
           </a:p>
         </p:txBody>
@@ -3858,6 +3878,9 @@
             <a:avLst/>
           </a:prstGeom>
           <a:ln>
+            <a:solidFill>
+              <a:srgbClr val="FF0000"/>
+            </a:solidFill>
             <a:tailEnd type="triangle"/>
           </a:ln>
         </p:spPr>
@@ -3906,22 +3929,38 @@
           <a:p>
             <a:pPr algn="ctr"/>
             <a:r>
-              <a:rPr lang="en-US" sz="1000" dirty="0" err="1"/>
+              <a:rPr lang="en-US" sz="1000" dirty="0" err="1">
+                <a:solidFill>
+                  <a:srgbClr val="FF0000"/>
+                </a:solidFill>
+              </a:rPr>
               <a:t>uORF</a:t>
             </a:r>
-            <a:endParaRPr lang="en-US" sz="1000" dirty="0"/>
+            <a:endParaRPr lang="en-US" sz="1000" dirty="0">
+              <a:solidFill>
+                <a:srgbClr val="FF0000"/>
+              </a:solidFill>
+            </a:endParaRPr>
           </a:p>
           <a:p>
             <a:pPr algn="ctr"/>
             <a:r>
-              <a:rPr lang="en-US" sz="1000" dirty="0"/>
+              <a:rPr lang="en-US" sz="1000" dirty="0">
+                <a:solidFill>
+                  <a:srgbClr val="FF0000"/>
+                </a:solidFill>
+              </a:rPr>
               <a:t>UUA</a:t>
             </a:r>
           </a:p>
           <a:p>
             <a:pPr algn="ctr"/>
             <a:r>
-              <a:rPr lang="en-US" sz="1000" dirty="0"/>
+              <a:rPr lang="en-US" sz="1000" dirty="0">
+                <a:solidFill>
+                  <a:srgbClr val="FF0000"/>
+                </a:solidFill>
+              </a:rPr>
               <a:t>codon</a:t>
             </a:r>
           </a:p>
@@ -3950,6 +3989,9 @@
             <a:avLst/>
           </a:prstGeom>
           <a:ln>
+            <a:solidFill>
+              <a:srgbClr val="FF0000"/>
+            </a:solidFill>
             <a:tailEnd type="triangle"/>
           </a:ln>
         </p:spPr>
@@ -4059,6 +4101,9 @@
             <a:avLst/>
           </a:prstGeom>
           <a:ln>
+            <a:solidFill>
+              <a:srgbClr val="FF0000"/>
+            </a:solidFill>
             <a:tailEnd type="triangle"/>
           </a:ln>
         </p:spPr>
@@ -4284,6 +4329,11 @@
               <a:gd name="adj2" fmla="val 16104"/>
             </a:avLst>
           </a:prstGeom>
+          <a:ln>
+            <a:solidFill>
+              <a:srgbClr val="FF0000"/>
+            </a:solidFill>
+          </a:ln>
         </p:spPr>
         <p:style>
           <a:lnRef idx="1">
@@ -4338,14 +4388,26 @@
           <a:p>
             <a:pPr algn="ctr"/>
             <a:r>
-              <a:rPr lang="en-US" sz="1000" dirty="0"/>
+              <a:rPr lang="en-US" sz="1000" dirty="0">
+                <a:solidFill>
+                  <a:srgbClr val="FF0000"/>
+                </a:solidFill>
+              </a:rPr>
               <a:t>Putative </a:t>
             </a:r>
             <a:r>
-              <a:rPr lang="en-US" sz="1000" dirty="0" err="1"/>
+              <a:rPr lang="en-US" sz="1000" dirty="0" err="1">
+                <a:solidFill>
+                  <a:srgbClr val="FF0000"/>
+                </a:solidFill>
+              </a:rPr>
               <a:t>uORF</a:t>
             </a:r>
-            <a:endParaRPr lang="en-US" sz="1000" dirty="0"/>
+            <a:endParaRPr lang="en-US" sz="1000" dirty="0">
+              <a:solidFill>
+                <a:srgbClr val="FF0000"/>
+              </a:solidFill>
+            </a:endParaRPr>
           </a:p>
         </p:txBody>
       </p:sp>

</xml_diff>